<commit_message>
Finalize L11, add folder for course presentations
</commit_message>
<xml_diff>
--- a/Lecture05_Matching/Lecture5_Matching_2022F.pptx
+++ b/Lecture05_Matching/Lecture5_Matching_2022F.pptx
@@ -474,7 +474,7 @@
           <a:p>
             <a:fld id="{EF911157-0FC2-4F06-8D61-FD647FE4E19D}" type="datetimeFigureOut">
               <a:rPr lang="en-US" smtClean="0"/>
-              <a:t>10/7/2022</a:t>
+              <a:t>11/22/2022</a:t>
             </a:fld>
             <a:endParaRPr lang="en-US"/>
           </a:p>
@@ -794,6 +794,14 @@
               <a:buFont typeface="Arial" panose="020B0604020202020204" pitchFamily="34" charset="0"/>
               <a:buNone/>
             </a:pPr>
+            <a:r>
+              <a:rPr lang="en-US" dirty="0"/>
+              <a:t>To update in slides; https://twitter.com/noah_greifer/status/1594767637476786176?s=12&amp;t=JtoNtnM6S4Wz0WbZ5NfFxg (new package/method). Mention that R really is better for Stata when it comes </a:t>
+            </a:r>
+            <a:r>
+              <a:rPr lang="en-US"/>
+              <a:t>to matching. </a:t>
+            </a:r>
             <a:endParaRPr lang="en-US" dirty="0"/>
           </a:p>
         </p:txBody>
@@ -5745,7 +5753,7 @@
             <a:fld id="{0972D05C-DCFB-4BB6-B49C-AC126BF3ED2C}" type="datetimeFigureOut">
               <a:rPr lang="en-US" smtClean="0"/>
               <a:pPr/>
-              <a:t>10/7/2022</a:t>
+              <a:t>11/22/2022</a:t>
             </a:fld>
             <a:endParaRPr lang="en-US"/>
           </a:p>
@@ -5975,7 +5983,7 @@
             <a:fld id="{0972D05C-DCFB-4BB6-B49C-AC126BF3ED2C}" type="datetimeFigureOut">
               <a:rPr lang="en-US" smtClean="0"/>
               <a:pPr/>
-              <a:t>10/7/2022</a:t>
+              <a:t>11/22/2022</a:t>
             </a:fld>
             <a:endParaRPr lang="en-US"/>
           </a:p>
@@ -6157,7 +6165,7 @@
             <a:fld id="{0972D05C-DCFB-4BB6-B49C-AC126BF3ED2C}" type="datetimeFigureOut">
               <a:rPr lang="en-US" smtClean="0"/>
               <a:pPr/>
-              <a:t>10/7/2022</a:t>
+              <a:t>11/22/2022</a:t>
             </a:fld>
             <a:endParaRPr lang="en-US"/>
           </a:p>
@@ -6329,7 +6337,7 @@
             <a:fld id="{0972D05C-DCFB-4BB6-B49C-AC126BF3ED2C}" type="datetimeFigureOut">
               <a:rPr lang="en-US" smtClean="0"/>
               <a:pPr/>
-              <a:t>10/7/2022</a:t>
+              <a:t>11/22/2022</a:t>
             </a:fld>
             <a:endParaRPr lang="en-US"/>
           </a:p>
@@ -6585,7 +6593,7 @@
             <a:fld id="{0972D05C-DCFB-4BB6-B49C-AC126BF3ED2C}" type="datetimeFigureOut">
               <a:rPr lang="en-US" smtClean="0"/>
               <a:pPr/>
-              <a:t>10/7/2022</a:t>
+              <a:t>11/22/2022</a:t>
             </a:fld>
             <a:endParaRPr lang="en-US"/>
           </a:p>
@@ -6913,7 +6921,7 @@
             <a:fld id="{0972D05C-DCFB-4BB6-B49C-AC126BF3ED2C}" type="datetimeFigureOut">
               <a:rPr lang="en-US" smtClean="0"/>
               <a:pPr/>
-              <a:t>10/7/2022</a:t>
+              <a:t>11/22/2022</a:t>
             </a:fld>
             <a:endParaRPr lang="en-US"/>
           </a:p>
@@ -7366,7 +7374,7 @@
             <a:fld id="{0972D05C-DCFB-4BB6-B49C-AC126BF3ED2C}" type="datetimeFigureOut">
               <a:rPr lang="en-US" smtClean="0"/>
               <a:pPr/>
-              <a:t>10/7/2022</a:t>
+              <a:t>11/22/2022</a:t>
             </a:fld>
             <a:endParaRPr lang="en-US"/>
           </a:p>
@@ -7486,7 +7494,7 @@
             <a:fld id="{0972D05C-DCFB-4BB6-B49C-AC126BF3ED2C}" type="datetimeFigureOut">
               <a:rPr lang="en-US" smtClean="0"/>
               <a:pPr/>
-              <a:t>10/7/2022</a:t>
+              <a:t>11/22/2022</a:t>
             </a:fld>
             <a:endParaRPr lang="en-US"/>
           </a:p>
@@ -7583,7 +7591,7 @@
             <a:fld id="{0972D05C-DCFB-4BB6-B49C-AC126BF3ED2C}" type="datetimeFigureOut">
               <a:rPr lang="en-US" smtClean="0"/>
               <a:pPr/>
-              <a:t>10/7/2022</a:t>
+              <a:t>11/22/2022</a:t>
             </a:fld>
             <a:endParaRPr lang="en-US"/>
           </a:p>
@@ -7872,7 +7880,7 @@
             <a:fld id="{0972D05C-DCFB-4BB6-B49C-AC126BF3ED2C}" type="datetimeFigureOut">
               <a:rPr lang="en-US" smtClean="0"/>
               <a:pPr/>
-              <a:t>10/7/2022</a:t>
+              <a:t>11/22/2022</a:t>
             </a:fld>
             <a:endParaRPr lang="en-US"/>
           </a:p>
@@ -8196,7 +8204,7 @@
             <a:fld id="{0972D05C-DCFB-4BB6-B49C-AC126BF3ED2C}" type="datetimeFigureOut">
               <a:rPr lang="en-US" smtClean="0"/>
               <a:pPr/>
-              <a:t>10/7/2022</a:t>
+              <a:t>11/22/2022</a:t>
             </a:fld>
             <a:endParaRPr lang="en-US"/>
           </a:p>
@@ -8451,7 +8459,7 @@
             <a:fld id="{0972D05C-DCFB-4BB6-B49C-AC126BF3ED2C}" type="datetimeFigureOut">
               <a:rPr lang="en-US" smtClean="0"/>
               <a:pPr/>
-              <a:t>10/7/2022</a:t>
+              <a:t>11/22/2022</a:t>
             </a:fld>
             <a:endParaRPr lang="en-US" dirty="0"/>
           </a:p>

</xml_diff>